<commit_message>
Add front page & Add "E"s to titles
</commit_message>
<xml_diff>
--- a/Final_slides/E1.pptx
+++ b/Final_slides/E1.pptx
@@ -5,8 +5,9 @@
     <p:sldMasterId id="2147483648" r:id="rId1"/>
   </p:sldMasterIdLst>
   <p:sldIdLst>
-    <p:sldId id="257" r:id="rId2"/>
-    <p:sldId id="259" r:id="rId3"/>
+    <p:sldId id="260" r:id="rId2"/>
+    <p:sldId id="257" r:id="rId3"/>
+    <p:sldId id="259" r:id="rId4"/>
   </p:sldIdLst>
   <p:sldSz cx="12192000" cy="6858000"/>
   <p:notesSz cx="6858000" cy="9144000"/>
@@ -260,7 +261,7 @@
           <a:p>
             <a:fld id="{E17F7779-9C11-46A1-9C91-FCD18852C054}" type="datetimeFigureOut">
               <a:rPr lang="en-GB" smtClean="0"/>
-              <a:t>01/01/2024</a:t>
+              <a:t>02/01/2024</a:t>
             </a:fld>
             <a:endParaRPr lang="en-GB"/>
           </a:p>
@@ -458,7 +459,7 @@
           <a:p>
             <a:fld id="{E17F7779-9C11-46A1-9C91-FCD18852C054}" type="datetimeFigureOut">
               <a:rPr lang="en-GB" smtClean="0"/>
-              <a:t>01/01/2024</a:t>
+              <a:t>02/01/2024</a:t>
             </a:fld>
             <a:endParaRPr lang="en-GB"/>
           </a:p>
@@ -666,7 +667,7 @@
           <a:p>
             <a:fld id="{E17F7779-9C11-46A1-9C91-FCD18852C054}" type="datetimeFigureOut">
               <a:rPr lang="en-GB" smtClean="0"/>
-              <a:t>01/01/2024</a:t>
+              <a:t>02/01/2024</a:t>
             </a:fld>
             <a:endParaRPr lang="en-GB"/>
           </a:p>
@@ -864,7 +865,7 @@
           <a:p>
             <a:fld id="{E17F7779-9C11-46A1-9C91-FCD18852C054}" type="datetimeFigureOut">
               <a:rPr lang="en-GB" smtClean="0"/>
-              <a:t>01/01/2024</a:t>
+              <a:t>02/01/2024</a:t>
             </a:fld>
             <a:endParaRPr lang="en-GB"/>
           </a:p>
@@ -1139,7 +1140,7 @@
           <a:p>
             <a:fld id="{E17F7779-9C11-46A1-9C91-FCD18852C054}" type="datetimeFigureOut">
               <a:rPr lang="en-GB" smtClean="0"/>
-              <a:t>01/01/2024</a:t>
+              <a:t>02/01/2024</a:t>
             </a:fld>
             <a:endParaRPr lang="en-GB"/>
           </a:p>
@@ -1404,7 +1405,7 @@
           <a:p>
             <a:fld id="{E17F7779-9C11-46A1-9C91-FCD18852C054}" type="datetimeFigureOut">
               <a:rPr lang="en-GB" smtClean="0"/>
-              <a:t>01/01/2024</a:t>
+              <a:t>02/01/2024</a:t>
             </a:fld>
             <a:endParaRPr lang="en-GB"/>
           </a:p>
@@ -1816,7 +1817,7 @@
           <a:p>
             <a:fld id="{E17F7779-9C11-46A1-9C91-FCD18852C054}" type="datetimeFigureOut">
               <a:rPr lang="en-GB" smtClean="0"/>
-              <a:t>01/01/2024</a:t>
+              <a:t>02/01/2024</a:t>
             </a:fld>
             <a:endParaRPr lang="en-GB"/>
           </a:p>
@@ -1957,7 +1958,7 @@
           <a:p>
             <a:fld id="{E17F7779-9C11-46A1-9C91-FCD18852C054}" type="datetimeFigureOut">
               <a:rPr lang="en-GB" smtClean="0"/>
-              <a:t>01/01/2024</a:t>
+              <a:t>02/01/2024</a:t>
             </a:fld>
             <a:endParaRPr lang="en-GB"/>
           </a:p>
@@ -2070,7 +2071,7 @@
           <a:p>
             <a:fld id="{E17F7779-9C11-46A1-9C91-FCD18852C054}" type="datetimeFigureOut">
               <a:rPr lang="en-GB" smtClean="0"/>
-              <a:t>01/01/2024</a:t>
+              <a:t>02/01/2024</a:t>
             </a:fld>
             <a:endParaRPr lang="en-GB"/>
           </a:p>
@@ -2381,7 +2382,7 @@
           <a:p>
             <a:fld id="{E17F7779-9C11-46A1-9C91-FCD18852C054}" type="datetimeFigureOut">
               <a:rPr lang="en-GB" smtClean="0"/>
-              <a:t>01/01/2024</a:t>
+              <a:t>02/01/2024</a:t>
             </a:fld>
             <a:endParaRPr lang="en-GB"/>
           </a:p>
@@ -2669,7 +2670,7 @@
           <a:p>
             <a:fld id="{E17F7779-9C11-46A1-9C91-FCD18852C054}" type="datetimeFigureOut">
               <a:rPr lang="en-GB" smtClean="0"/>
-              <a:t>01/01/2024</a:t>
+              <a:t>02/01/2024</a:t>
             </a:fld>
             <a:endParaRPr lang="en-GB"/>
           </a:p>
@@ -2910,7 +2911,7 @@
           <a:p>
             <a:fld id="{E17F7779-9C11-46A1-9C91-FCD18852C054}" type="datetimeFigureOut">
               <a:rPr lang="en-GB" smtClean="0"/>
-              <a:t>01/01/2024</a:t>
+              <a:t>02/01/2024</a:t>
             </a:fld>
             <a:endParaRPr lang="en-GB"/>
           </a:p>
@@ -3340,6 +3341,131 @@
           <p:cNvPr id="2" name="Title 1">
             <a:extLst>
               <a:ext uri="{FF2B5EF4-FFF2-40B4-BE49-F238E27FC236}">
+                <a16:creationId xmlns:a16="http://schemas.microsoft.com/office/drawing/2014/main" id="{D413CB5F-FEFF-59ED-0684-8CD3E503A86F}"/>
+              </a:ext>
+            </a:extLst>
+          </p:cNvPr>
+          <p:cNvSpPr>
+            <a:spLocks noGrp="1"/>
+          </p:cNvSpPr>
+          <p:nvPr>
+            <p:ph type="ctrTitle"/>
+          </p:nvPr>
+        </p:nvSpPr>
+        <p:spPr/>
+        <p:txBody>
+          <a:bodyPr/>
+          <a:lstStyle/>
+          <a:p>
+            <a:r>
+              <a:rPr lang="en-GB" dirty="0">
+                <a:solidFill>
+                  <a:schemeClr val="bg1"/>
+                </a:solidFill>
+              </a:rPr>
+              <a:t>IEP-E</a:t>
+            </a:r>
+          </a:p>
+        </p:txBody>
+      </p:sp>
+      <p:sp>
+        <p:nvSpPr>
+          <p:cNvPr id="3" name="Subtitle 2">
+            <a:extLst>
+              <a:ext uri="{FF2B5EF4-FFF2-40B4-BE49-F238E27FC236}">
+                <a16:creationId xmlns:a16="http://schemas.microsoft.com/office/drawing/2014/main" id="{243C2FA1-B998-94BF-6468-C15959F42BEC}"/>
+              </a:ext>
+            </a:extLst>
+          </p:cNvPr>
+          <p:cNvSpPr>
+            <a:spLocks noGrp="1"/>
+          </p:cNvSpPr>
+          <p:nvPr>
+            <p:ph type="subTitle" idx="1"/>
+          </p:nvPr>
+        </p:nvSpPr>
+        <p:spPr/>
+        <p:txBody>
+          <a:bodyPr/>
+          <a:lstStyle/>
+          <a:p>
+            <a:r>
+              <a:rPr lang="en-GB" dirty="0">
+                <a:solidFill>
+                  <a:schemeClr val="bg1"/>
+                </a:solidFill>
+              </a:rPr>
+              <a:t>Brian Chen (bc604)</a:t>
+            </a:r>
+          </a:p>
+          <a:p>
+            <a:r>
+              <a:rPr lang="en-GB" dirty="0">
+                <a:solidFill>
+                  <a:schemeClr val="bg1"/>
+                </a:solidFill>
+              </a:rPr>
+              <a:t>Christmas Vacation</a:t>
+            </a:r>
+            <a:r>
+              <a:rPr lang="en-GB">
+                <a:solidFill>
+                  <a:schemeClr val="bg1"/>
+                </a:solidFill>
+              </a:rPr>
+              <a:t>, 12/2023-01/2024</a:t>
+            </a:r>
+            <a:endParaRPr lang="en-GB" dirty="0">
+              <a:solidFill>
+                <a:schemeClr val="bg1"/>
+              </a:solidFill>
+            </a:endParaRPr>
+          </a:p>
+        </p:txBody>
+      </p:sp>
+    </p:spTree>
+    <p:extLst>
+      <p:ext uri="{BB962C8B-B14F-4D97-AF65-F5344CB8AC3E}">
+        <p14:creationId xmlns:p14="http://schemas.microsoft.com/office/powerpoint/2010/main" val="2325122468"/>
+      </p:ext>
+    </p:extLst>
+  </p:cSld>
+  <p:clrMapOvr>
+    <a:masterClrMapping/>
+  </p:clrMapOvr>
+</p:sld>
+</file>
+
+<file path=ppt/slides/slide2.xml><?xml version="1.0" encoding="utf-8"?>
+<p:sld xmlns:a="http://schemas.openxmlformats.org/drawingml/2006/main" xmlns:r="http://schemas.openxmlformats.org/officeDocument/2006/relationships" xmlns:p="http://schemas.openxmlformats.org/presentationml/2006/main">
+  <p:cSld>
+    <p:bg>
+      <p:bgPr>
+        <a:solidFill>
+          <a:schemeClr val="tx1"/>
+        </a:solidFill>
+        <a:effectLst/>
+      </p:bgPr>
+    </p:bg>
+    <p:spTree>
+      <p:nvGrpSpPr>
+        <p:cNvPr id="1" name=""/>
+        <p:cNvGrpSpPr/>
+        <p:nvPr/>
+      </p:nvGrpSpPr>
+      <p:grpSpPr>
+        <a:xfrm>
+          <a:off x="0" y="0"/>
+          <a:ext cx="0" cy="0"/>
+          <a:chOff x="0" y="0"/>
+          <a:chExt cx="0" cy="0"/>
+        </a:xfrm>
+      </p:grpSpPr>
+      <p:sp>
+        <p:nvSpPr>
+          <p:cNvPr id="2" name="Title 1">
+            <a:extLst>
+              <a:ext uri="{FF2B5EF4-FFF2-40B4-BE49-F238E27FC236}">
                 <a16:creationId xmlns:a16="http://schemas.microsoft.com/office/drawing/2014/main" id="{D4459FBB-51BC-1A7A-923F-8C04A90404C6}"/>
               </a:ext>
             </a:extLst>
@@ -3401,8 +3527,8 @@
           </a:xfrm>
         </p:spPr>
       </p:pic>
-      <mc:AlternateContent xmlns:mc="http://schemas.openxmlformats.org/markup-compatibility/2006">
-        <mc:Choice xmlns:a14="http://schemas.microsoft.com/office/drawing/2010/main" Requires="a14">
+      <mc:AlternateContent xmlns:mc="http://schemas.openxmlformats.org/markup-compatibility/2006" xmlns:a14="http://schemas.microsoft.com/office/drawing/2010/main">
+        <mc:Choice Requires="a14">
           <p:sp>
             <p:nvSpPr>
               <p:cNvPr id="6" name="TextBox 5">
@@ -3560,7 +3686,7 @@
             </p:txBody>
           </p:sp>
         </mc:Choice>
-        <mc:Fallback>
+        <mc:Fallback xmlns="">
           <p:sp>
             <p:nvSpPr>
               <p:cNvPr id="6" name="TextBox 5">
@@ -3618,7 +3744,7 @@
 </p:sld>
 </file>
 
-<file path=ppt/slides/slide2.xml><?xml version="1.0" encoding="utf-8"?>
+<file path=ppt/slides/slide3.xml><?xml version="1.0" encoding="utf-8"?>
 <p:sld xmlns:a="http://schemas.openxmlformats.org/drawingml/2006/main" xmlns:r="http://schemas.openxmlformats.org/officeDocument/2006/relationships" xmlns:p="http://schemas.openxmlformats.org/presentationml/2006/main">
   <p:cSld>
     <p:bg>
@@ -3675,8 +3801,8 @@
           </a:p>
         </p:txBody>
       </p:sp>
-      <mc:AlternateContent xmlns:mc="http://schemas.openxmlformats.org/markup-compatibility/2006">
-        <mc:Choice xmlns:a14="http://schemas.microsoft.com/office/drawing/2010/main" Requires="a14">
+      <mc:AlternateContent xmlns:mc="http://schemas.openxmlformats.org/markup-compatibility/2006" xmlns:a14="http://schemas.microsoft.com/office/drawing/2010/main">
+        <mc:Choice Requires="a14">
           <p:sp>
             <p:nvSpPr>
               <p:cNvPr id="6" name="TextBox 5">
@@ -3898,7 +4024,7 @@
             </p:txBody>
           </p:sp>
         </mc:Choice>
-        <mc:Fallback>
+        <mc:Fallback xmlns="">
           <p:sp>
             <p:nvSpPr>
               <p:cNvPr id="6" name="TextBox 5">

</xml_diff>